<commit_message>
Celebrating 500 pages and rev200. More on iterators and overall fixes. Post-exam version progress.
git-svn-id: https://svn.code.sf.net/p/cpp-lects-rus/code/trunk@200 39143b06-f351-456c-9f92-4cd32fad6823
</commit_message>
<xml_diff>
--- a/slides/lec2-10-iterators.pptx
+++ b/slides/lec2-10-iterators.pptx
@@ -374,7 +374,7 @@
             <a:fld id="{96DFF08F-DC6B-4601-B491-B0F83F6DD2DA}" type="datetimeFigureOut">
               <a:rPr lang="en-US" dirty="0"/>
               <a:pPr/>
-              <a:t>4/21/2017</a:t>
+              <a:t>5/20/2017</a:t>
             </a:fld>
             <a:endParaRPr lang="en-US" dirty="0"/>
           </a:p>
@@ -591,7 +591,7 @@
           <a:p>
             <a:fld id="{96DFF08F-DC6B-4601-B491-B0F83F6DD2DA}" type="datetimeFigureOut">
               <a:rPr lang="en-US" dirty="0"/>
-              <a:t>4/21/2017</a:t>
+              <a:t>5/20/2017</a:t>
             </a:fld>
             <a:endParaRPr lang="en-US" dirty="0"/>
           </a:p>
@@ -766,7 +766,7 @@
           <a:p>
             <a:fld id="{96DFF08F-DC6B-4601-B491-B0F83F6DD2DA}" type="datetimeFigureOut">
               <a:rPr lang="en-US" dirty="0"/>
-              <a:t>4/21/2017</a:t>
+              <a:t>5/20/2017</a:t>
             </a:fld>
             <a:endParaRPr lang="en-US" dirty="0"/>
           </a:p>
@@ -931,7 +931,7 @@
           <a:p>
             <a:fld id="{96DFF08F-DC6B-4601-B491-B0F83F6DD2DA}" type="datetimeFigureOut">
               <a:rPr lang="en-US" dirty="0"/>
-              <a:t>4/21/2017</a:t>
+              <a:t>5/20/2017</a:t>
             </a:fld>
             <a:endParaRPr lang="en-US" dirty="0"/>
           </a:p>
@@ -1177,7 +1177,7 @@
           <a:p>
             <a:fld id="{96DFF08F-DC6B-4601-B491-B0F83F6DD2DA}" type="datetimeFigureOut">
               <a:rPr lang="en-US" dirty="0"/>
-              <a:t>4/21/2017</a:t>
+              <a:t>5/20/2017</a:t>
             </a:fld>
             <a:endParaRPr lang="en-US" dirty="0"/>
           </a:p>
@@ -1495,7 +1495,7 @@
           <a:p>
             <a:fld id="{96DFF08F-DC6B-4601-B491-B0F83F6DD2DA}" type="datetimeFigureOut">
               <a:rPr lang="en-US" dirty="0"/>
-              <a:t>4/21/2017</a:t>
+              <a:t>5/20/2017</a:t>
             </a:fld>
             <a:endParaRPr lang="en-US" dirty="0"/>
           </a:p>
@@ -1914,7 +1914,7 @@
           <a:p>
             <a:fld id="{96DFF08F-DC6B-4601-B491-B0F83F6DD2DA}" type="datetimeFigureOut">
               <a:rPr lang="en-US" dirty="0"/>
-              <a:t>4/21/2017</a:t>
+              <a:t>5/20/2017</a:t>
             </a:fld>
             <a:endParaRPr lang="en-US" dirty="0"/>
           </a:p>
@@ -2027,7 +2027,7 @@
           <a:p>
             <a:fld id="{96DFF08F-DC6B-4601-B491-B0F83F6DD2DA}" type="datetimeFigureOut">
               <a:rPr lang="en-US" dirty="0"/>
-              <a:t>4/21/2017</a:t>
+              <a:t>5/20/2017</a:t>
             </a:fld>
             <a:endParaRPr lang="en-US" dirty="0"/>
           </a:p>
@@ -2117,7 +2117,7 @@
           <a:p>
             <a:fld id="{96DFF08F-DC6B-4601-B491-B0F83F6DD2DA}" type="datetimeFigureOut">
               <a:rPr lang="en-US" dirty="0"/>
-              <a:t>4/21/2017</a:t>
+              <a:t>5/20/2017</a:t>
             </a:fld>
             <a:endParaRPr lang="en-US" dirty="0"/>
           </a:p>
@@ -2402,7 +2402,7 @@
           <a:p>
             <a:fld id="{96DFF08F-DC6B-4601-B491-B0F83F6DD2DA}" type="datetimeFigureOut">
               <a:rPr lang="en-US" dirty="0"/>
-              <a:t>4/21/2017</a:t>
+              <a:t>5/20/2017</a:t>
             </a:fld>
             <a:endParaRPr lang="en-US" dirty="0"/>
           </a:p>
@@ -2669,7 +2669,7 @@
           <a:p>
             <a:fld id="{96DFF08F-DC6B-4601-B491-B0F83F6DD2DA}" type="datetimeFigureOut">
               <a:rPr lang="en-US" dirty="0"/>
-              <a:t>4/21/2017</a:t>
+              <a:t>5/20/2017</a:t>
             </a:fld>
             <a:endParaRPr lang="en-US" dirty="0"/>
           </a:p>
@@ -2918,7 +2918,7 @@
             <a:fld id="{96DFF08F-DC6B-4601-B491-B0F83F6DD2DA}" type="datetimeFigureOut">
               <a:rPr lang="en-US" dirty="0"/>
               <a:pPr/>
-              <a:t>4/21/2017</a:t>
+              <a:t>5/20/2017</a:t>
             </a:fld>
             <a:endParaRPr lang="en-US" dirty="0"/>
           </a:p>
@@ -3872,13 +3872,7 @@
               <a:rPr lang="en-US" smtClean="0">
                 <a:latin typeface="Consolas" panose="020B0609020204030204" pitchFamily="49" charset="0"/>
               </a:rPr>
-              <a:t>  </a:t>
-            </a:r>
-            <a:r>
-              <a:rPr lang="en-US" smtClean="0">
-                <a:latin typeface="Consolas" panose="020B0609020204030204" pitchFamily="49" charset="0"/>
-              </a:rPr>
-              <a:t>template </a:t>
+              <a:t>  template </a:t>
             </a:r>
             <a:r>
               <a:rPr lang="en-US">
@@ -4260,16 +4254,7 @@
                 </a:solidFill>
                 <a:latin typeface="Consolas" panose="020B0609020204030204" pitchFamily="49" charset="0"/>
               </a:rPr>
-              <a:t>                        </a:t>
-            </a:r>
-            <a:r>
-              <a:rPr lang="en-US" smtClean="0">
-                <a:solidFill>
-                  <a:srgbClr val="0000FF"/>
-                </a:solidFill>
-                <a:latin typeface="Consolas" panose="020B0609020204030204" pitchFamily="49" charset="0"/>
-              </a:rPr>
-              <a:t>++declval&lt;Iter</a:t>
+              <a:t>                        ++declval&lt;Iter</a:t>
             </a:r>
             <a:r>
               <a:rPr lang="en-US">
@@ -4304,25 +4289,7 @@
                 </a:solidFill>
                 <a:latin typeface="Consolas" panose="020B0609020204030204" pitchFamily="49" charset="0"/>
               </a:rPr>
-              <a:t>                             </a:t>
-            </a:r>
-            <a:r>
-              <a:rPr lang="en-US" smtClean="0">
-                <a:solidFill>
-                  <a:srgbClr val="0000FF"/>
-                </a:solidFill>
-                <a:latin typeface="Consolas" panose="020B0609020204030204" pitchFamily="49" charset="0"/>
-              </a:rPr>
-              <a:t>   </a:t>
-            </a:r>
-            <a:r>
-              <a:rPr lang="en-US" smtClean="0">
-                <a:solidFill>
-                  <a:srgbClr val="0000FF"/>
-                </a:solidFill>
-                <a:latin typeface="Consolas" panose="020B0609020204030204" pitchFamily="49" charset="0"/>
-              </a:rPr>
-              <a:t>void())&gt; &gt;</a:t>
+              <a:t>                                void())&gt; &gt;</a:t>
             </a:r>
             <a:r>
               <a:rPr lang="en-US">
@@ -5019,21 +4986,6 @@
               <a:t>, v.end());</a:t>
             </a:r>
           </a:p>
-          <a:p>
-            <a:r>
-              <a:rPr lang="ru-RU" smtClean="0">
-                <a:latin typeface="Consolas" panose="020B0609020204030204" pitchFamily="49" charset="0"/>
-              </a:rPr>
-              <a:t>Проблемы не было бы при возможности сделать </a:t>
-            </a:r>
-            <a:r>
-              <a:rPr lang="en-US" smtClean="0">
-                <a:latin typeface="Consolas" panose="020B0609020204030204" pitchFamily="49" charset="0"/>
-              </a:rPr>
-              <a:t>sort(range{++v.begin(), v.end()})</a:t>
-            </a:r>
-            <a:endParaRPr lang="en-US"/>
-          </a:p>
         </p:txBody>
       </p:sp>
     </p:spTree>
@@ -8189,7 +8141,13 @@
               <a:rPr lang="en-US" smtClean="0">
                 <a:latin typeface="Consolas" panose="020B0609020204030204" pitchFamily="49" charset="0"/>
               </a:rPr>
-              <a:t>copy (vec.begin</a:t>
+              <a:t>cross_copy </a:t>
+            </a:r>
+            <a:r>
+              <a:rPr lang="en-US" smtClean="0">
+                <a:latin typeface="Consolas" panose="020B0609020204030204" pitchFamily="49" charset="0"/>
+              </a:rPr>
+              <a:t>(vec.begin</a:t>
             </a:r>
             <a:r>
               <a:rPr lang="en-US">
@@ -8657,19 +8615,11 @@
             </a:r>
             <a:r>
               <a:rPr lang="en-US" smtClean="0"/>
-              <a:t> </a:t>
-            </a:r>
-            <a:r>
-              <a:rPr lang="en-US" smtClean="0"/>
-              <a:t>(</a:t>
-            </a:r>
-            <a:r>
-              <a:rPr lang="ru-RU" smtClean="0"/>
-              <a:t>видите ли вы</a:t>
-            </a:r>
-            <a:r>
-              <a:rPr lang="ru-RU" smtClean="0"/>
-              <a:t> в нём проблемы?</a:t>
+              <a:t> (</a:t>
+            </a:r>
+            <a:r>
+              <a:rPr lang="ru-RU" smtClean="0"/>
+              <a:t>видите ли вы в нём проблемы?</a:t>
             </a:r>
             <a:r>
               <a:rPr lang="en-US" smtClean="0"/>
@@ -12286,11 +12236,7 @@
           <a:p>
             <a:r>
               <a:rPr lang="ru-RU" smtClean="0"/>
-              <a:t>Основная </a:t>
-            </a:r>
-            <a:r>
-              <a:rPr lang="ru-RU" smtClean="0"/>
-              <a:t>проблема: время </a:t>
+              <a:t>Основная проблема: время </a:t>
             </a:r>
             <a:r>
               <a:rPr lang="en-US" smtClean="0"/>
@@ -12970,13 +12916,7 @@
               <a:rPr lang="en-US" smtClean="0">
                 <a:latin typeface="Consolas" panose="020B0609020204030204" pitchFamily="49" charset="0"/>
               </a:rPr>
-              <a:t>cout &lt;&lt; *ri &lt;&lt; " " &lt;&lt; *it &lt;&lt; endl</a:t>
-            </a:r>
-            <a:r>
-              <a:rPr lang="en-US" smtClean="0">
-                <a:latin typeface="Consolas" panose="020B0609020204030204" pitchFamily="49" charset="0"/>
-              </a:rPr>
-              <a:t>;</a:t>
+              <a:t>cout &lt;&lt; *ri &lt;&lt; " " &lt;&lt; *it &lt;&lt; endl;</a:t>
             </a:r>
             <a:r>
               <a:rPr lang="ru-RU" smtClean="0">
@@ -13114,13 +13054,7 @@
               <a:rPr lang="en-US" smtClean="0">
                 <a:latin typeface="Consolas" panose="020B0609020204030204" pitchFamily="49" charset="0"/>
               </a:rPr>
-              <a:t>cout &lt;&lt; *ri &lt;&lt; " " &lt;&lt; *it &lt;&lt; endl</a:t>
-            </a:r>
-            <a:r>
-              <a:rPr lang="en-US" smtClean="0">
-                <a:latin typeface="Consolas" panose="020B0609020204030204" pitchFamily="49" charset="0"/>
-              </a:rPr>
-              <a:t>;</a:t>
+              <a:t>cout &lt;&lt; *ri &lt;&lt; " " &lt;&lt; *it &lt;&lt; endl;</a:t>
             </a:r>
             <a:r>
               <a:rPr lang="ru-RU" smtClean="0">
@@ -13134,9 +13068,6 @@
               </a:rPr>
               <a:t>// 3 4</a:t>
             </a:r>
-            <a:endParaRPr lang="en-US" smtClean="0">
-              <a:latin typeface="Consolas" panose="020B0609020204030204" pitchFamily="49" charset="0"/>
-            </a:endParaRPr>
           </a:p>
         </p:txBody>
       </p:sp>
@@ -14263,11 +14194,7 @@
             </a:r>
             <a:r>
               <a:rPr lang="ru-RU" smtClean="0"/>
-              <a:t>обойти </a:t>
-            </a:r>
-            <a:r>
-              <a:rPr lang="ru-RU" smtClean="0"/>
-              <a:t>в прямом порядке</a:t>
+              <a:t>обойти в прямом порядке</a:t>
             </a:r>
           </a:p>
           <a:p>
@@ -14292,11 +14219,7 @@
             </a:r>
             <a:r>
               <a:rPr lang="ru-RU" smtClean="0"/>
-              <a:t>обойти </a:t>
-            </a:r>
-            <a:r>
-              <a:rPr lang="ru-RU" smtClean="0"/>
-              <a:t>в обратном порядке</a:t>
+              <a:t>обойти в обратном порядке</a:t>
             </a:r>
           </a:p>
           <a:p>
@@ -14846,16 +14769,7 @@
                 </a:solidFill>
                 <a:latin typeface="Consolas" panose="020B0609020204030204" pitchFamily="49" charset="0"/>
               </a:rPr>
-              <a:t>back_insert_iterator </a:t>
-            </a:r>
-            <a:r>
-              <a:rPr lang="en-US" sz="2400" smtClean="0">
-                <a:solidFill>
-                  <a:srgbClr val="0000FF"/>
-                </a:solidFill>
-                <a:latin typeface="Consolas" panose="020B0609020204030204" pitchFamily="49" charset="0"/>
-              </a:rPr>
-              <a:t>&lt; vector&lt;int&gt; &gt;</a:t>
+              <a:t>back_insert_iterator &lt; vector&lt;int&gt; &gt;</a:t>
             </a:r>
             <a:r>
               <a:rPr lang="en-US" sz="2400" smtClean="0">
@@ -14910,13 +14824,7 @@
               <a:rPr lang="en-US" sz="2400" smtClean="0">
                 <a:latin typeface="Consolas" panose="020B0609020204030204" pitchFamily="49" charset="0"/>
               </a:rPr>
-              <a:t>auto </a:t>
-            </a:r>
-            <a:r>
-              <a:rPr lang="en-US" sz="2400" smtClean="0">
-                <a:latin typeface="Consolas" panose="020B0609020204030204" pitchFamily="49" charset="0"/>
-              </a:rPr>
-              <a:t>bins </a:t>
+              <a:t>auto bins </a:t>
             </a:r>
             <a:r>
               <a:rPr lang="en-US" sz="2400" smtClean="0">
@@ -15129,13 +15037,7 @@
               <a:rPr lang="en-US" sz="2400" smtClean="0">
                 <a:latin typeface="Consolas" panose="020B0609020204030204" pitchFamily="49" charset="0"/>
               </a:rPr>
-              <a:t>back_insert_iterator </a:t>
-            </a:r>
-            <a:r>
-              <a:rPr lang="en-US" sz="2400" smtClean="0">
-                <a:latin typeface="Consolas" panose="020B0609020204030204" pitchFamily="49" charset="0"/>
-              </a:rPr>
-              <a:t>&lt; vector&lt;int&gt; &gt; bins (vec); </a:t>
+              <a:t>back_insert_iterator &lt; vector&lt;int&gt; &gt; bins (vec); </a:t>
             </a:r>
             <a:endParaRPr lang="ru-RU" sz="2400" smtClean="0">
               <a:latin typeface="Consolas" panose="020B0609020204030204" pitchFamily="49" charset="0"/>
@@ -15184,13 +15086,7 @@
               <a:rPr lang="en-US" sz="2400" smtClean="0">
                 <a:latin typeface="Consolas" panose="020B0609020204030204" pitchFamily="49" charset="0"/>
               </a:rPr>
-              <a:t>auto </a:t>
-            </a:r>
-            <a:r>
-              <a:rPr lang="en-US" sz="2400" smtClean="0">
-                <a:latin typeface="Consolas" panose="020B0609020204030204" pitchFamily="49" charset="0"/>
-              </a:rPr>
-              <a:t>bins = back_inserter (vec); </a:t>
+              <a:t>auto bins = back_inserter (vec); </a:t>
             </a:r>
             <a:endParaRPr lang="ru-RU" sz="2400" smtClean="0">
               <a:latin typeface="Consolas" panose="020B0609020204030204" pitchFamily="49" charset="0"/>
@@ -15207,51 +15103,42 @@
                 </a:solidFill>
                 <a:latin typeface="Consolas" panose="020B0609020204030204" pitchFamily="49" charset="0"/>
               </a:rPr>
-              <a:t>bins </a:t>
+              <a:t>bins = 1</a:t>
+            </a:r>
+            <a:r>
+              <a:rPr lang="en-US" sz="2400">
+                <a:latin typeface="Consolas" panose="020B0609020204030204" pitchFamily="49" charset="0"/>
+              </a:rPr>
+              <a:t>;</a:t>
             </a:r>
             <a:r>
               <a:rPr lang="en-US" sz="2400" smtClean="0">
-                <a:solidFill>
-                  <a:srgbClr val="0000FF"/>
-                </a:solidFill>
-                <a:latin typeface="Consolas" panose="020B0609020204030204" pitchFamily="49" charset="0"/>
-              </a:rPr>
-              <a:t>= 1</a:t>
-            </a:r>
-            <a:r>
-              <a:rPr lang="en-US" sz="2400">
-                <a:latin typeface="Consolas" panose="020B0609020204030204" pitchFamily="49" charset="0"/>
-              </a:rPr>
-              <a:t>;</a:t>
+                <a:latin typeface="Consolas" panose="020B0609020204030204" pitchFamily="49" charset="0"/>
+              </a:rPr>
+              <a:t> // </a:t>
+            </a:r>
+            <a:r>
+              <a:rPr lang="ru-RU" sz="2400" smtClean="0">
+                <a:latin typeface="Consolas" panose="020B0609020204030204" pitchFamily="49" charset="0"/>
+              </a:rPr>
+              <a:t>вставка элемента</a:t>
             </a:r>
             <a:r>
               <a:rPr lang="en-US" sz="2400" smtClean="0">
                 <a:latin typeface="Consolas" panose="020B0609020204030204" pitchFamily="49" charset="0"/>
               </a:rPr>
-              <a:t> // </a:t>
+              <a:t>, </a:t>
             </a:r>
             <a:r>
               <a:rPr lang="ru-RU" sz="2400" smtClean="0">
                 <a:latin typeface="Consolas" panose="020B0609020204030204" pitchFamily="49" charset="0"/>
               </a:rPr>
-              <a:t>вставка элемента</a:t>
+              <a:t>как </a:t>
             </a:r>
             <a:r>
               <a:rPr lang="en-US" sz="2400" smtClean="0">
                 <a:latin typeface="Consolas" panose="020B0609020204030204" pitchFamily="49" charset="0"/>
               </a:rPr>
-              <a:t>, </a:t>
-            </a:r>
-            <a:r>
-              <a:rPr lang="ru-RU" sz="2400" smtClean="0">
-                <a:latin typeface="Consolas" panose="020B0609020204030204" pitchFamily="49" charset="0"/>
-              </a:rPr>
-              <a:t>как </a:t>
-            </a:r>
-            <a:r>
-              <a:rPr lang="en-US" sz="2400" smtClean="0">
-                <a:latin typeface="Consolas" panose="020B0609020204030204" pitchFamily="49" charset="0"/>
-              </a:rPr>
               <a:t>vec.push_back(1)</a:t>
             </a:r>
           </a:p>
@@ -15265,11 +15152,7 @@
             </a:r>
             <a:r>
               <a:rPr lang="en-US" smtClean="0"/>
-              <a:t>bins</a:t>
-            </a:r>
-            <a:r>
-              <a:rPr lang="en-US" smtClean="0"/>
-              <a:t>++?</a:t>
+              <a:t>bins++?</a:t>
             </a:r>
             <a:r>
               <a:rPr lang="ru-RU" smtClean="0"/>
@@ -15282,11 +15165,7 @@
             </a:pPr>
             <a:r>
               <a:rPr lang="ru-RU" smtClean="0"/>
-              <a:t>О</a:t>
-            </a:r>
-            <a:r>
-              <a:rPr lang="ru-RU" smtClean="0"/>
-              <a:t>твет</a:t>
+              <a:t>Ответ</a:t>
             </a:r>
             <a:r>
               <a:rPr lang="ru-RU"/>
@@ -15298,11 +15177,7 @@
             </a:r>
             <a:r>
               <a:rPr lang="ru-RU"/>
-              <a:t>ничего осмысленного не делает. Поэтому </a:t>
-            </a:r>
-            <a:r>
-              <a:rPr lang="ru-RU"/>
-              <a:t>работает </a:t>
+              <a:t>ничего осмысленного не делает. Поэтому работает </a:t>
             </a:r>
             <a:r>
               <a:rPr lang="ru-RU" smtClean="0"/>
@@ -15448,19 +15323,7 @@
               <a:rPr lang="en-US" smtClean="0">
                 <a:latin typeface="Consolas" panose="020B0609020204030204" pitchFamily="49" charset="0"/>
               </a:rPr>
-              <a:t>auto it = find (</a:t>
-            </a:r>
-            <a:r>
-              <a:rPr lang="en-US" smtClean="0">
-                <a:latin typeface="Consolas" panose="020B0609020204030204" pitchFamily="49" charset="0"/>
-              </a:rPr>
-              <a:t>v.begin(), v.end(), </a:t>
-            </a:r>
-            <a:r>
-              <a:rPr lang="en-US" smtClean="0">
-                <a:latin typeface="Consolas" panose="020B0609020204030204" pitchFamily="49" charset="0"/>
-              </a:rPr>
-              <a:t>3);</a:t>
+              <a:t>auto it = find (v.begin(), v.end(), 3);</a:t>
             </a:r>
           </a:p>
           <a:p>
@@ -15482,13 +15345,7 @@
               <a:rPr lang="en-US" smtClean="0">
                 <a:latin typeface="Consolas" panose="020B0609020204030204" pitchFamily="49" charset="0"/>
               </a:rPr>
-              <a:t>insit = </a:t>
-            </a:r>
-            <a:r>
-              <a:rPr lang="en-US" smtClean="0">
-                <a:latin typeface="Consolas" panose="020B0609020204030204" pitchFamily="49" charset="0"/>
-              </a:rPr>
-              <a:t>5; // </a:t>
+              <a:t>insit = 5; // </a:t>
             </a:r>
             <a:r>
               <a:rPr lang="ru-RU" smtClean="0">
@@ -17898,13 +17755,7 @@
               <a:rPr lang="en-US" sz="2000" smtClean="0">
                 <a:latin typeface="Consolas" panose="020B0609020204030204" pitchFamily="49" charset="0"/>
               </a:rPr>
-              <a:t>); // </a:t>
-            </a:r>
-            <a:r>
-              <a:rPr lang="en-US" sz="2000" smtClean="0">
-                <a:latin typeface="Consolas" panose="020B0609020204030204" pitchFamily="49" charset="0"/>
-              </a:rPr>
-              <a:t>10, 20, 30, 1, 2, ..</a:t>
+              <a:t>); // 10, 20, 30, 1, 2, ..</a:t>
             </a:r>
             <a:endParaRPr lang="en-US" sz="2000">
               <a:latin typeface="Consolas" panose="020B0609020204030204" pitchFamily="49" charset="0"/>
@@ -18014,13 +17865,7 @@
               <a:rPr lang="en-US">
                 <a:latin typeface="Consolas" panose="020B0609020204030204" pitchFamily="49" charset="0"/>
               </a:rPr>
-              <a:t>(auto elt </a:t>
-            </a:r>
-            <a:r>
-              <a:rPr lang="en-US">
-                <a:latin typeface="Consolas" panose="020B0609020204030204" pitchFamily="49" charset="0"/>
-              </a:rPr>
-              <a:t>: </a:t>
+              <a:t>(auto elt : </a:t>
             </a:r>
             <a:r>
               <a:rPr lang="en-US" smtClean="0">
@@ -18053,19 +17898,25 @@
               <a:rPr lang="en-US">
                 <a:latin typeface="Consolas" panose="020B0609020204030204" pitchFamily="49" charset="0"/>
               </a:rPr>
-              <a:t>copy </a:t>
+              <a:t>copy (</a:t>
+            </a:r>
+            <a:r>
+              <a:rPr lang="en-US" smtClean="0">
+                <a:latin typeface="Consolas" panose="020B0609020204030204" pitchFamily="49" charset="0"/>
+              </a:rPr>
+              <a:t>vec.begin</a:t>
             </a:r>
             <a:r>
               <a:rPr lang="en-US">
                 <a:latin typeface="Consolas" panose="020B0609020204030204" pitchFamily="49" charset="0"/>
               </a:rPr>
-              <a:t>(</a:t>
-            </a:r>
-            <a:r>
-              <a:rPr lang="en-US" smtClean="0">
-                <a:latin typeface="Consolas" panose="020B0609020204030204" pitchFamily="49" charset="0"/>
-              </a:rPr>
-              <a:t>vec.begin</a:t>
+              <a:t>(), </a:t>
+            </a:r>
+            <a:r>
+              <a:rPr lang="en-US" smtClean="0">
+                <a:latin typeface="Consolas" panose="020B0609020204030204" pitchFamily="49" charset="0"/>
+              </a:rPr>
+              <a:t>vec.end</a:t>
             </a:r>
             <a:r>
               <a:rPr lang="en-US">
@@ -18077,31 +17928,13 @@
               <a:rPr lang="en-US" smtClean="0">
                 <a:latin typeface="Consolas" panose="020B0609020204030204" pitchFamily="49" charset="0"/>
               </a:rPr>
-              <a:t>vec.end</a:t>
+              <a:t>ostream_iterator&lt;int</a:t>
             </a:r>
             <a:r>
               <a:rPr lang="en-US">
                 <a:latin typeface="Consolas" panose="020B0609020204030204" pitchFamily="49" charset="0"/>
               </a:rPr>
-              <a:t>(), </a:t>
-            </a:r>
-            <a:r>
-              <a:rPr lang="en-US" smtClean="0">
-                <a:latin typeface="Consolas" panose="020B0609020204030204" pitchFamily="49" charset="0"/>
-              </a:rPr>
-              <a:t>ostream_iterator&lt;int</a:t>
-            </a:r>
-            <a:r>
-              <a:rPr lang="en-US">
-                <a:latin typeface="Consolas" panose="020B0609020204030204" pitchFamily="49" charset="0"/>
-              </a:rPr>
-              <a:t>&gt; (cout, "\</a:t>
-            </a:r>
-            <a:r>
-              <a:rPr lang="en-US">
-                <a:latin typeface="Consolas" panose="020B0609020204030204" pitchFamily="49" charset="0"/>
-              </a:rPr>
-              <a:t>n</a:t>
+              <a:t>&gt; (cout, "\n</a:t>
             </a:r>
             <a:r>
               <a:rPr lang="en-US" smtClean="0">
@@ -18733,11 +18566,7 @@
             </a:r>
             <a:r>
               <a:rPr lang="ru-RU" smtClean="0"/>
-              <a:t>сингулярен, но вполне </a:t>
-            </a:r>
-            <a:r>
-              <a:rPr lang="ru-RU" smtClean="0"/>
-              <a:t>валиден</a:t>
+              <a:t>сингулярен, но вполне валиден</a:t>
             </a:r>
             <a:r>
               <a:rPr lang="en-US" smtClean="0"/>
@@ -18749,7 +18578,6 @@
               <a:rPr lang="ru-RU" smtClean="0"/>
               <a:t>Но ниже ситуация хуже:</a:t>
             </a:r>
-            <a:endParaRPr lang="ru-RU" smtClean="0"/>
           </a:p>
           <a:p>
             <a:pPr marL="45720" indent="0">
@@ -18759,13 +18587,7 @@
               <a:rPr lang="en-US" smtClean="0">
                 <a:latin typeface="Consolas" panose="020B0609020204030204" pitchFamily="49" charset="0"/>
               </a:rPr>
-              <a:t>list&lt;string&gt;::iterator </a:t>
-            </a:r>
-            <a:r>
-              <a:rPr lang="en-US" smtClean="0">
-                <a:latin typeface="Consolas" panose="020B0609020204030204" pitchFamily="49" charset="0"/>
-              </a:rPr>
-              <a:t>lstit;</a:t>
+              <a:t>list&lt;string&gt;::iterator lstit;</a:t>
             </a:r>
           </a:p>
           <a:p>
@@ -19463,9 +19285,6 @@
               </a:rPr>
               <a:t>v.clear();</a:t>
             </a:r>
-            <a:endParaRPr lang="en-US" smtClean="0">
-              <a:latin typeface="Consolas" panose="020B0609020204030204" pitchFamily="49" charset="0"/>
-            </a:endParaRPr>
           </a:p>
           <a:p>
             <a:pPr marL="45720" indent="0">
@@ -20402,7 +20221,6 @@
               <a:rPr lang="ru-RU" smtClean="0"/>
               <a:t>инкремент ++</a:t>
             </a:r>
-            <a:endParaRPr lang="ru-RU" smtClean="0"/>
           </a:p>
           <a:p>
             <a:pPr lvl="1"/>

</xml_diff>